<commit_message>
kitty stop process, updated cheatsheet
</commit_message>
<xml_diff>
--- a/layout_cheatsheet.pptx
+++ b/layout_cheatsheet.pptx
@@ -5713,8 +5713,8 @@
         </p:nvSpPr>
         <p:spPr bwMode="auto">
           <a:xfrm flipH="0" flipV="0">
-            <a:off x="7209904" y="1227094"/>
-            <a:ext cx="987876" cy="274679"/>
+            <a:off x="7209903" y="1089754"/>
+            <a:ext cx="988236" cy="259439"/>
           </a:xfrm>
           <a:prstGeom prst="rect">
             <a:avLst/>
@@ -5730,7 +5730,7 @@
               <a:defRPr/>
             </a:pPr>
             <a:r>
-              <a:rPr lang="en-US" sz="1200" b="0" i="0" u="none" strike="noStrike" cap="none" spc="0">
+              <a:rPr lang="en-US" sz="1100" b="0" i="0" u="none" strike="noStrike" cap="none" spc="0">
                 <a:solidFill>
                   <a:schemeClr val="tx1"/>
                 </a:solidFill>
@@ -5744,7 +5744,7 @@
               <a:t>quit</a:t>
             </a:r>
             <a:r>
-              <a:rPr lang="en-US" sz="1200" b="0" i="0" u="none" strike="noStrike" cap="none" spc="0">
+              <a:rPr lang="en-US" sz="1100" b="0" i="0" u="none" strike="noStrike" cap="none" spc="0">
                 <a:solidFill>
                   <a:schemeClr val="tx1"/>
                 </a:solidFill>
@@ -5757,7 +5757,7 @@
               </a:rPr>
               <a:t>Win</a:t>
             </a:r>
-            <a:endParaRPr sz="1200"/>
+            <a:endParaRPr sz="1100"/>
           </a:p>
         </p:txBody>
       </p:sp>
@@ -8561,6 +8561,140 @@
             <a:endParaRPr sz="1000">
               <a:highlight>
                 <a:srgbClr val="00FF00"/>
+              </a:highlight>
+            </a:endParaRPr>
+          </a:p>
+        </p:txBody>
+      </p:sp>
+      <p:sp>
+        <p:nvSpPr>
+          <p:cNvPr id="2136870639" name=""/>
+          <p:cNvSpPr txBox="1"/>
+          <p:nvPr/>
+        </p:nvSpPr>
+        <p:spPr bwMode="auto">
+          <a:xfrm flipH="0" flipV="0">
+            <a:off x="7143291" y="1317621"/>
+            <a:ext cx="966047" cy="228960"/>
+          </a:xfrm>
+          <a:prstGeom prst="rect">
+            <a:avLst/>
+          </a:prstGeom>
+          <a:noFill/>
+        </p:spPr>
+        <p:txBody>
+          <a:bodyPr vertOverflow="overflow" horzOverflow="overflow" vert="horz" wrap="square" lIns="91440" tIns="45720" rIns="91440" bIns="45720" numCol="1" spcCol="0" rtlCol="0" fromWordArt="0" anchor="t" anchorCtr="0" forceAA="0" upright="0" compatLnSpc="0">
+            <a:spAutoFit/>
+          </a:bodyPr>
+          <a:p>
+            <a:pPr>
+              <a:defRPr/>
+            </a:pPr>
+            <a:r>
+              <a:rPr lang="en-US" sz="900" b="0" i="0" u="none" strike="noStrike" cap="none" spc="0">
+                <a:solidFill>
+                  <a:schemeClr val="tx1"/>
+                </a:solidFill>
+                <a:highlight>
+                  <a:srgbClr val="FF00FF"/>
+                </a:highlight>
+                <a:latin typeface="Arial"/>
+                <a:ea typeface="Arial"/>
+                <a:cs typeface="Arial"/>
+              </a:rPr>
+              <a:t>kitty_swap</a:t>
+            </a:r>
+            <a:endParaRPr sz="1100">
+              <a:highlight>
+                <a:srgbClr val="FF0000"/>
+              </a:highlight>
+            </a:endParaRPr>
+          </a:p>
+        </p:txBody>
+      </p:sp>
+      <p:sp>
+        <p:nvSpPr>
+          <p:cNvPr id="892635096" name=""/>
+          <p:cNvSpPr txBox="1"/>
+          <p:nvPr/>
+        </p:nvSpPr>
+        <p:spPr bwMode="auto">
+          <a:xfrm flipH="0" flipV="0">
+            <a:off x="282083" y="395876"/>
+            <a:ext cx="777349" cy="335639"/>
+          </a:xfrm>
+          <a:prstGeom prst="rect">
+            <a:avLst/>
+          </a:prstGeom>
+          <a:noFill/>
+        </p:spPr>
+        <p:txBody>
+          <a:bodyPr vertOverflow="overflow" horzOverflow="overflow" vert="horz" wrap="square" lIns="91440" tIns="45720" rIns="91440" bIns="45720" numCol="1" spcCol="0" rtlCol="0" fromWordArt="0" anchor="t" anchorCtr="0" forceAA="0" upright="0" compatLnSpc="0">
+            <a:spAutoFit/>
+          </a:bodyPr>
+          <a:p>
+            <a:pPr>
+              <a:defRPr/>
+            </a:pPr>
+            <a:r>
+              <a:rPr lang="en-US" sz="1600" b="0" i="0" u="none" strike="noStrike" cap="none" spc="0">
+                <a:solidFill>
+                  <a:schemeClr val="tx1"/>
+                </a:solidFill>
+                <a:highlight>
+                  <a:srgbClr val="00FFFF"/>
+                </a:highlight>
+                <a:latin typeface="Arial"/>
+                <a:ea typeface="Arial"/>
+                <a:cs typeface="Arial"/>
+              </a:rPr>
+              <a:t>quit</a:t>
+            </a:r>
+            <a:endParaRPr/>
+          </a:p>
+        </p:txBody>
+      </p:sp>
+      <p:sp>
+        <p:nvSpPr>
+          <p:cNvPr id="1819087995" name=""/>
+          <p:cNvSpPr txBox="1"/>
+          <p:nvPr/>
+        </p:nvSpPr>
+        <p:spPr bwMode="auto">
+          <a:xfrm flipH="0" flipV="0">
+            <a:off x="1926141" y="1253030"/>
+            <a:ext cx="1139557" cy="259439"/>
+          </a:xfrm>
+          <a:prstGeom prst="rect">
+            <a:avLst/>
+          </a:prstGeom>
+          <a:noFill/>
+        </p:spPr>
+        <p:txBody>
+          <a:bodyPr vertOverflow="overflow" horzOverflow="overflow" vert="horz" wrap="square" lIns="91440" tIns="45720" rIns="91440" bIns="45720" numCol="1" spcCol="0" rtlCol="0" fromWordArt="0" anchor="t" anchorCtr="0" forceAA="0" upright="0" compatLnSpc="0">
+            <a:spAutoFit/>
+          </a:bodyPr>
+          <a:p>
+            <a:pPr>
+              <a:defRPr/>
+            </a:pPr>
+            <a:r>
+              <a:rPr lang="en-US" sz="1100" b="0" i="0" u="none" strike="noStrike" cap="none" spc="0">
+                <a:solidFill>
+                  <a:schemeClr val="tx1"/>
+                </a:solidFill>
+                <a:highlight>
+                  <a:srgbClr val="00FFFF"/>
+                </a:highlight>
+                <a:latin typeface="Arial"/>
+                <a:ea typeface="Arial"/>
+                <a:cs typeface="Arial"/>
+              </a:rPr>
+              <a:t>process_stop</a:t>
+            </a:r>
+            <a:endParaRPr sz="1400">
+              <a:highlight>
+                <a:srgbClr val="00FFFF"/>
               </a:highlight>
             </a:endParaRPr>
           </a:p>

</xml_diff>